<commit_message>
file was open, not sure if anything actually changed
</commit_message>
<xml_diff>
--- a/media/2022/07/bison.pptx
+++ b/media/2022/07/bison.pptx
@@ -50682,9 +50682,9 @@
             </a:avLst>
           </a:prstGeom>
           <a:noFill/>
-          <a:ln w="57150">
+          <a:ln w="76200">
             <a:solidFill>
-              <a:schemeClr val="accent6"/>
+              <a:srgbClr val="7030A0"/>
             </a:solidFill>
           </a:ln>
         </p:spPr>

</xml_diff>